<commit_message>
KL files updating map files to repo
</commit_message>
<xml_diff>
--- a/Smart Cities.pptx
+++ b/Smart Cities.pptx
@@ -3869,6 +3869,15 @@
           <a:p>
             <a:r>
               <a:rPr lang="en-US" dirty="0"/>
+              <a:t>There is a lot of data- especially in the census</a:t>
+            </a:r>
+          </a:p>
+          <a:p>
+            <a:endParaRPr lang="en-US" dirty="0"/>
+          </a:p>
+          <a:p>
+            <a:r>
+              <a:rPr lang="en-US" dirty="0"/>
               <a:t>Discuss any difficulties that arose, and how you dealt with them</a:t>
             </a:r>
           </a:p>
@@ -4440,9 +4449,12 @@
           </a:bodyPr>
           <a:lstStyle/>
           <a:p>
-            <a:r>
-              <a:rPr lang="en-US" dirty="0"/>
-              <a:t>In Chicago, is there a correlation between housing price, income, or unemployment and the walkability of an area?</a:t>
+            <a:pPr marL="0" indent="0">
+              <a:buNone/>
+            </a:pPr>
+            <a:r>
+              <a:rPr lang="en-US" dirty="0"/>
+              <a:t>In Chicago, is there a correlation between housing price, income, or poverty and the walkability of an area?</a:t>
             </a:r>
           </a:p>
           <a:p>
@@ -4997,7 +5009,15 @@
           <a:p>
             <a:r>
               <a:rPr lang="en-US" dirty="0"/>
-              <a:t>Data Analysis</a:t>
+              <a:t>The further outside the city you get the lower the </a:t>
+            </a:r>
+            <a:r>
+              <a:rPr lang="en-US" dirty="0" err="1"/>
+              <a:t>walkscore</a:t>
+            </a:r>
+            <a:r>
+              <a:rPr lang="en-US" dirty="0"/>
+              <a:t> and the higher the income</a:t>
             </a:r>
           </a:p>
           <a:p>

</xml_diff>